<commit_message>
Added some images to the slide show.  Also put in the notes at the bottom what website I got them from.
</commit_message>
<xml_diff>
--- a/artififical intelligence.pptx
+++ b/artififical intelligence.pptx
@@ -1317,6 +1317,112 @@
               <a:rPr lang="en-US" smtClean="0"/>
               <a:pPr/>
               <a:t>10</a:t>
+            </a:fld>
+            <a:endParaRPr lang="en-US"/>
+          </a:p>
+        </p:txBody>
+      </p:sp>
+    </p:spTree>
+  </p:cSld>
+  <p:clrMapOvr>
+    <a:masterClrMapping/>
+  </p:clrMapOvr>
+</p:notes>
+</file>
+
+<file path=ppt/notesSlides/notesSlide6.xml><?xml version="1.0" encoding="utf-8"?>
+<p:notes xmlns:a="http://schemas.openxmlformats.org/drawingml/2006/main" xmlns:r="http://schemas.openxmlformats.org/officeDocument/2006/relationships" xmlns:p="http://schemas.openxmlformats.org/presentationml/2006/main">
+  <p:cSld>
+    <p:spTree>
+      <p:nvGrpSpPr>
+        <p:cNvPr id="1" name=""/>
+        <p:cNvGrpSpPr/>
+        <p:nvPr/>
+      </p:nvGrpSpPr>
+      <p:grpSpPr>
+        <a:xfrm>
+          <a:off x="0" y="0"/>
+          <a:ext cx="0" cy="0"/>
+          <a:chOff x="0" y="0"/>
+          <a:chExt cx="0" cy="0"/>
+        </a:xfrm>
+      </p:grpSpPr>
+      <p:sp>
+        <p:nvSpPr>
+          <p:cNvPr id="2" name="Slide Image Placeholder 1"/>
+          <p:cNvSpPr>
+            <a:spLocks noGrp="1" noRot="1" noChangeAspect="1"/>
+          </p:cNvSpPr>
+          <p:nvPr>
+            <p:ph type="sldImg"/>
+          </p:nvPr>
+        </p:nvSpPr>
+        <p:spPr/>
+      </p:sp>
+      <p:sp>
+        <p:nvSpPr>
+          <p:cNvPr id="3" name="Notes Placeholder 2"/>
+          <p:cNvSpPr>
+            <a:spLocks noGrp="1"/>
+          </p:cNvSpPr>
+          <p:nvPr>
+            <p:ph type="body" idx="1"/>
+          </p:nvPr>
+        </p:nvSpPr>
+        <p:spPr/>
+        <p:txBody>
+          <a:bodyPr>
+            <a:normAutofit/>
+          </a:bodyPr>
+          <a:lstStyle/>
+          <a:p>
+            <a:r>
+              <a:rPr lang="en-US" dirty="0" smtClean="0"/>
+              <a:t>-</a:t>
+            </a:r>
+            <a:r>
+              <a:rPr lang="en-US" dirty="0" err="1" smtClean="0"/>
+              <a:t>Viki</a:t>
+            </a:r>
+            <a:r>
+              <a:rPr lang="en-US" baseline="0" dirty="0" smtClean="0"/>
+              <a:t> Picture : http://getdclu.wordpress.com/2009/08/25/making-and-controlling-a-robotic-public</a:t>
+            </a:r>
+            <a:r>
+              <a:rPr lang="en-US" baseline="0" dirty="0" smtClean="0"/>
+              <a:t>/</a:t>
+            </a:r>
+          </a:p>
+          <a:p>
+            <a:r>
+              <a:rPr lang="en-US" baseline="0" smtClean="0"/>
+              <a:t>- Assembly Line : http://robotsftw.com/2009/08/so-are-robots-stealing-our-jobs/</a:t>
+            </a:r>
+          </a:p>
+          <a:p>
+            <a:endParaRPr lang="en-US" dirty="0"/>
+          </a:p>
+        </p:txBody>
+      </p:sp>
+      <p:sp>
+        <p:nvSpPr>
+          <p:cNvPr id="4" name="Slide Number Placeholder 3"/>
+          <p:cNvSpPr>
+            <a:spLocks noGrp="1"/>
+          </p:cNvSpPr>
+          <p:nvPr>
+            <p:ph type="sldNum" sz="quarter" idx="10"/>
+          </p:nvPr>
+        </p:nvSpPr>
+        <p:spPr/>
+        <p:txBody>
+          <a:bodyPr/>
+          <a:lstStyle/>
+          <a:p>
+            <a:fld id="{35E8DBCF-1A31-4444-8CFB-0DA56D6CEB6C}" type="slidenum">
+              <a:rPr lang="en-US" smtClean="0"/>
+              <a:pPr/>
+              <a:t>14</a:t>
             </a:fld>
             <a:endParaRPr lang="en-US"/>
           </a:p>
@@ -5668,7 +5774,7 @@
           <p:nvPr/>
         </p:nvPicPr>
         <p:blipFill>
-          <a:blip r:embed="rId2"/>
+          <a:blip r:embed="rId2" cstate="print"/>
           <a:srcRect/>
           <a:stretch>
             <a:fillRect/>
@@ -5694,7 +5800,7 @@
           <p:nvPr/>
         </p:nvPicPr>
         <p:blipFill>
-          <a:blip r:embed="rId3"/>
+          <a:blip r:embed="rId3" cstate="print"/>
           <a:srcRect/>
           <a:stretch>
             <a:fillRect/>
@@ -5925,7 +6031,7 @@
           <p:nvPr/>
         </p:nvPicPr>
         <p:blipFill>
-          <a:blip r:embed="rId2"/>
+          <a:blip r:embed="rId2" cstate="print"/>
           <a:srcRect/>
           <a:stretch>
             <a:fillRect/>
@@ -5951,7 +6057,7 @@
           <p:nvPr/>
         </p:nvPicPr>
         <p:blipFill>
-          <a:blip r:embed="rId3"/>
+          <a:blip r:embed="rId3" cstate="print"/>
           <a:srcRect/>
           <a:stretch>
             <a:fillRect/>
@@ -6009,7 +6115,7 @@
           <p:nvPr/>
         </p:nvPicPr>
         <p:blipFill>
-          <a:blip r:embed="rId2"/>
+          <a:blip r:embed="rId2" cstate="print"/>
           <a:srcRect/>
           <a:stretch>
             <a:fillRect/>
@@ -6108,6 +6214,9 @@
             <a:endParaRPr lang="en-US" dirty="0" smtClean="0"/>
           </a:p>
           <a:p>
+            <a:endParaRPr lang="en-US" dirty="0" smtClean="0"/>
+          </a:p>
+          <a:p>
             <a:r>
               <a:rPr lang="en-US" dirty="0" smtClean="0"/>
               <a:t>Rogue AI</a:t>
@@ -6115,11 +6224,70 @@
           </a:p>
         </p:txBody>
       </p:sp>
+      <p:pic>
+        <p:nvPicPr>
+          <p:cNvPr id="5126" name="Picture 6" descr="http://getdclu.files.wordpress.com/2009/08/ethics-making-and-controlling-a-robotic-public.jpg?w=568&amp;h=289"/>
+          <p:cNvPicPr>
+            <a:picLocks noChangeAspect="1" noChangeArrowheads="1"/>
+          </p:cNvPicPr>
+          <p:nvPr/>
+        </p:nvPicPr>
+        <p:blipFill>
+          <a:blip r:embed="rId3" cstate="print"/>
+          <a:srcRect/>
+          <a:stretch>
+            <a:fillRect/>
+          </a:stretch>
+        </p:blipFill>
+        <p:spPr bwMode="auto">
+          <a:xfrm>
+            <a:off x="4394200" y="4495800"/>
+            <a:ext cx="5410200" cy="2800351"/>
+          </a:xfrm>
+          <a:prstGeom prst="rect">
+            <a:avLst/>
+          </a:prstGeom>
+          <a:noFill/>
+        </p:spPr>
+      </p:pic>
+      <p:pic>
+        <p:nvPicPr>
+          <p:cNvPr id="6146" name="Picture 2" descr="Robots"/>
+          <p:cNvPicPr>
+            <a:picLocks noChangeAspect="1" noChangeArrowheads="1"/>
+          </p:cNvPicPr>
+          <p:nvPr/>
+        </p:nvPicPr>
+        <p:blipFill>
+          <a:blip r:embed="rId4" cstate="print"/>
+          <a:srcRect/>
+          <a:stretch>
+            <a:fillRect/>
+          </a:stretch>
+        </p:blipFill>
+        <p:spPr bwMode="auto">
+          <a:xfrm>
+            <a:off x="5308600" y="914400"/>
+            <a:ext cx="3657600" cy="2755392"/>
+          </a:xfrm>
+          <a:prstGeom prst="rect">
+            <a:avLst/>
+          </a:prstGeom>
+          <a:noFill/>
+        </p:spPr>
+      </p:pic>
     </p:spTree>
   </p:cSld>
   <p:clrMapOvr>
     <a:masterClrMapping/>
   </p:clrMapOvr>
+  <p:timing>
+    <p:tnLst>
+      <p:par>
+        <p:cTn id="1" dur="indefinite" restart="never" nodeType="tmRoot"/>
+      </p:par>
+    </p:tnLst>
+  </p:timing>
 </p:sld>
 </file>
 
@@ -6215,7 +6383,7 @@
           <p:nvPr/>
         </p:nvPicPr>
         <p:blipFill>
-          <a:blip r:embed="rId2"/>
+          <a:blip r:embed="rId2" cstate="print"/>
           <a:srcRect/>
           <a:stretch>
             <a:fillRect/>
@@ -6248,7 +6416,7 @@
           <p:nvPr/>
         </p:nvPicPr>
         <p:blipFill>
-          <a:blip r:embed="rId3"/>
+          <a:blip r:embed="rId3" cstate="print"/>
           <a:srcRect/>
           <a:stretch>
             <a:fillRect/>
@@ -6277,6 +6445,13 @@
   <p:clrMapOvr>
     <a:masterClrMapping/>
   </p:clrMapOvr>
+  <p:timing>
+    <p:tnLst>
+      <p:par>
+        <p:cTn id="1" dur="indefinite" restart="never" nodeType="tmRoot"/>
+      </p:par>
+    </p:tnLst>
+  </p:timing>
 </p:sld>
 </file>
 
@@ -6430,6 +6605,27 @@
               <a:buClr>
                 <a:srgbClr val="000000"/>
               </a:buClr>
+              <a:buFontTx/>
+              <a:buChar char="•"/>
+            </a:pPr>
+            <a:endParaRPr lang="en-US" sz="2700" dirty="0" smtClean="0">
+              <a:solidFill>
+                <a:srgbClr val="DEDEDE"/>
+              </a:solidFill>
+              <a:latin typeface="Trebuchet MS" pitchFamily="34" charset="0"/>
+            </a:endParaRPr>
+          </a:p>
+          <a:p>
+            <a:pPr marL="457200" lvl="1" indent="-342900">
+              <a:lnSpc>
+                <a:spcPct val="95000"/>
+              </a:lnSpc>
+              <a:spcBef>
+                <a:spcPct val="0"/>
+              </a:spcBef>
+              <a:buClr>
+                <a:srgbClr val="000000"/>
+              </a:buClr>
             </a:pPr>
             <a:r>
               <a:rPr lang="en-US" sz="2700" dirty="0" smtClean="0">
@@ -6440,6 +6636,25 @@
               </a:rPr>
               <a:t>How does it affect humanity?</a:t>
             </a:r>
+          </a:p>
+          <a:p>
+            <a:pPr marL="457200" lvl="1" indent="-342900">
+              <a:lnSpc>
+                <a:spcPct val="95000"/>
+              </a:lnSpc>
+              <a:spcBef>
+                <a:spcPct val="0"/>
+              </a:spcBef>
+              <a:buClr>
+                <a:srgbClr val="000000"/>
+              </a:buClr>
+            </a:pPr>
+            <a:endParaRPr lang="en-US" sz="2700" dirty="0" smtClean="0">
+              <a:solidFill>
+                <a:srgbClr val="DEDEDE"/>
+              </a:solidFill>
+              <a:latin typeface="Trebuchet MS" pitchFamily="34" charset="0"/>
+            </a:endParaRPr>
           </a:p>
           <a:p>
             <a:pPr marL="457200" lvl="1" indent="-342900">
@@ -6845,6 +7060,27 @@
               <a:buClr>
                 <a:srgbClr val="000000"/>
               </a:buClr>
+              <a:buFontTx/>
+              <a:buChar char="•"/>
+            </a:pPr>
+            <a:endParaRPr lang="en-US" sz="2700" dirty="0" smtClean="0">
+              <a:solidFill>
+                <a:srgbClr val="DEDEDE"/>
+              </a:solidFill>
+              <a:latin typeface="Trebuchet MS" pitchFamily="34" charset="0"/>
+            </a:endParaRPr>
+          </a:p>
+          <a:p>
+            <a:pPr marL="457200" lvl="1" indent="-342900">
+              <a:lnSpc>
+                <a:spcPct val="95000"/>
+              </a:lnSpc>
+              <a:spcBef>
+                <a:spcPct val="0"/>
+              </a:spcBef>
+              <a:buClr>
+                <a:srgbClr val="000000"/>
+              </a:buClr>
             </a:pPr>
             <a:r>
               <a:rPr lang="en-US" sz="2700" dirty="0" smtClean="0">
@@ -6855,6 +7091,25 @@
               </a:rPr>
               <a:t>How does it affect humanity?</a:t>
             </a:r>
+          </a:p>
+          <a:p>
+            <a:pPr marL="457200" lvl="1" indent="-342900">
+              <a:lnSpc>
+                <a:spcPct val="95000"/>
+              </a:lnSpc>
+              <a:spcBef>
+                <a:spcPct val="0"/>
+              </a:spcBef>
+              <a:buClr>
+                <a:srgbClr val="000000"/>
+              </a:buClr>
+            </a:pPr>
+            <a:endParaRPr lang="en-US" sz="2700" dirty="0" smtClean="0">
+              <a:solidFill>
+                <a:srgbClr val="DEDEDE"/>
+              </a:solidFill>
+              <a:latin typeface="Trebuchet MS" pitchFamily="34" charset="0"/>
+            </a:endParaRPr>
           </a:p>
           <a:p>
             <a:pPr marL="457200" lvl="1" indent="-342900">
@@ -7070,7 +7325,7 @@
           <p:nvPr/>
         </p:nvPicPr>
         <p:blipFill>
-          <a:blip r:embed="rId2"/>
+          <a:blip r:embed="rId2" cstate="print"/>
           <a:srcRect/>
           <a:stretch>
             <a:fillRect/>
@@ -7103,7 +7358,7 @@
           <p:nvPr/>
         </p:nvPicPr>
         <p:blipFill>
-          <a:blip r:embed="rId3"/>
+          <a:blip r:embed="rId3" cstate="print"/>
           <a:srcRect/>
           <a:stretch>
             <a:fillRect/>
@@ -7136,7 +7391,7 @@
           <p:nvPr/>
         </p:nvPicPr>
         <p:blipFill>
-          <a:blip r:embed="rId4"/>
+          <a:blip r:embed="rId4" cstate="print"/>
           <a:srcRect/>
           <a:stretch>
             <a:fillRect/>
@@ -7481,7 +7736,7 @@
           <p:nvPr/>
         </p:nvPicPr>
         <p:blipFill>
-          <a:blip r:embed="rId3"/>
+          <a:blip r:embed="rId3" cstate="print"/>
           <a:srcRect/>
           <a:stretch>
             <a:fillRect/>
@@ -7581,7 +7836,7 @@
           <p:nvPr/>
         </p:nvPicPr>
         <p:blipFill>
-          <a:blip r:embed="rId2"/>
+          <a:blip r:embed="rId2" cstate="print"/>
           <a:srcRect/>
           <a:stretch>
             <a:fillRect/>
@@ -7685,7 +7940,7 @@
           <p:nvPr/>
         </p:nvPicPr>
         <p:blipFill>
-          <a:blip r:embed="rId3"/>
+          <a:blip r:embed="rId3" cstate="print"/>
           <a:srcRect/>
           <a:stretch>
             <a:fillRect/>
@@ -7851,7 +8106,7 @@
           <p:nvPr/>
         </p:nvPicPr>
         <p:blipFill>
-          <a:blip r:embed="rId4"/>
+          <a:blip r:embed="rId4" cstate="print"/>
           <a:srcRect/>
           <a:stretch>
             <a:fillRect/>
@@ -8114,7 +8369,7 @@
           <p:nvPr/>
         </p:nvPicPr>
         <p:blipFill>
-          <a:blip r:embed="rId3"/>
+          <a:blip r:embed="rId3" cstate="print"/>
           <a:srcRect/>
           <a:stretch>
             <a:fillRect/>

</xml_diff>